<commit_message>
3D images generated; more poster done.
</commit_message>
<xml_diff>
--- a/IRP Paper/posterTemplate.pptx
+++ b/IRP Paper/posterTemplate.pptx
@@ -1253,7 +1253,7 @@
         <p:txBody>
           <a:bodyPr bIns="45000" lIns="90000" rIns="90000" tIns="45000"/>
           <a:p>
-            <a:fld id="{E1711101-31F1-4181-B121-519131D16191}" type="slidenum">
+            <a:fld id="{01314181-6151-41E1-B1D1-718151D1C171}" type="slidenum">
               <a:rPr lang="en-US" sz="8600">
                 <a:solidFill>
                   <a:srgbClr val="000000"/>
@@ -1756,15 +1756,6 @@
           </a:p>
           <a:p>
             <a:pPr algn="just"/>
-            <a:r>
-              <a:rPr lang="en-US" sz="3600">
-                <a:solidFill>
-                  <a:srgbClr val="000000"/>
-                </a:solidFill>
-                <a:latin typeface="Arial"/>
-              </a:rPr>
-              <a:t>.</a:t>
-            </a:r>
             <a:endParaRPr/>
           </a:p>
           <a:p>
@@ -2093,6 +2084,23 @@
                 <a:latin typeface="Arial"/>
               </a:rPr>
               <a:t>Per ei natum interpretaris, te mel populo recusabo. Eros omnesque lucilius cum ne. Veri eripuit assentior mei ne, et accusam periculis eos. Eam accusamus sadipscing cu, adipisci salutandi dissentiunt ex nam, meliore suscipit reformidans at nec. Ea mundi tation vim, ad graeco saperet sed. No sumo aliquam cum, sit vidisse consulatu cu.</a:t>
+            </a:r>
+            <a:endParaRPr/>
+          </a:p>
+          <a:p>
+            <a:pPr algn="just"/>
+            <a:endParaRPr/>
+          </a:p>
+          <a:p>
+            <a:pPr algn="just"/>
+            <a:r>
+              <a:rPr lang="en-US" sz="3600">
+                <a:solidFill>
+                  <a:srgbClr val="000000"/>
+                </a:solidFill>
+                <a:latin typeface="Arial"/>
+              </a:rPr>
+              <a:t>Acknowledgments and references!</a:t>
             </a:r>
             <a:endParaRPr/>
           </a:p>

</xml_diff>